<commit_message>
add openatom club logo
</commit_message>
<xml_diff>
--- a/PPT模板/华科开放原子开源俱乐部模板.pptx
+++ b/PPT模板/华科开放原子开源俱乐部模板.pptx
@@ -9,7 +9,7 @@
   </p:notesMasterIdLst>
   <p:sldIdLst>
     <p:sldId id="256" r:id="rId2"/>
-    <p:sldId id="257" r:id="rId3"/>
+    <p:sldId id="261" r:id="rId3"/>
     <p:sldId id="258" r:id="rId4"/>
     <p:sldId id="259" r:id="rId5"/>
     <p:sldId id="260" r:id="rId6"/>
@@ -201,7 +201,7 @@
           <a:p>
             <a:fld id="{3CA5CA05-0A2D-A742-9267-F735107A5C89}" type="datetimeFigureOut">
               <a:rPr kumimoji="1" lang="zh-CN" altLang="en-US" smtClean="0"/>
-              <a:t>2024/3/16</a:t>
+              <a:t>2024/11/20</a:t>
             </a:fld>
             <a:endParaRPr kumimoji="1" lang="zh-CN" altLang="en-US"/>
           </a:p>
@@ -662,38 +662,8 @@
         </p:blipFill>
         <p:spPr>
           <a:xfrm>
-            <a:off x="-284481" y="-339619"/>
-            <a:ext cx="5438012" cy="2181119"/>
-          </a:xfrm>
-          <a:prstGeom prst="rect">
-            <a:avLst/>
-          </a:prstGeom>
-        </p:spPr>
-      </p:pic>
-      <p:pic>
-        <p:nvPicPr>
-          <p:cNvPr id="5" name="图片 4">
-            <a:extLst>
-              <a:ext uri="{FF2B5EF4-FFF2-40B4-BE49-F238E27FC236}">
-                <a16:creationId xmlns:a16="http://schemas.microsoft.com/office/drawing/2014/main" id="{DCBD5B7D-20FD-F44A-8134-44B4E7E60ED1}"/>
-              </a:ext>
-            </a:extLst>
-          </p:cNvPr>
-          <p:cNvPicPr>
-            <a:picLocks noChangeAspect="1"/>
-          </p:cNvPicPr>
-          <p:nvPr userDrawn="1"/>
-        </p:nvPicPr>
-        <p:blipFill>
-          <a:blip r:embed="rId3"/>
-          <a:stretch>
-            <a:fillRect/>
-          </a:stretch>
-        </p:blipFill>
-        <p:spPr>
-          <a:xfrm>
-            <a:off x="8117935" y="-1"/>
-            <a:ext cx="4074065" cy="1440181"/>
+            <a:off x="-314961" y="-370099"/>
+            <a:ext cx="5080001" cy="2037525"/>
           </a:xfrm>
           <a:prstGeom prst="rect">
             <a:avLst/>
@@ -730,53 +700,28 @@
           <a:chExt cx="0" cy="0"/>
         </a:xfrm>
       </p:grpSpPr>
-      <p:pic>
-        <p:nvPicPr>
-          <p:cNvPr id="7" name="图片 6">
+      <p:sp>
+        <p:nvSpPr>
+          <p:cNvPr id="2" name="标题 1">
             <a:extLst>
               <a:ext uri="{FF2B5EF4-FFF2-40B4-BE49-F238E27FC236}">
-                <a16:creationId xmlns:a16="http://schemas.microsoft.com/office/drawing/2014/main" id="{2B54AA2A-BD54-F355-DD20-838B66B376D5}"/>
+                <a16:creationId xmlns:a16="http://schemas.microsoft.com/office/drawing/2014/main" id="{38DA0639-1433-E9D6-12EA-26DBAC823C06}"/>
               </a:ext>
             </a:extLst>
           </p:cNvPr>
-          <p:cNvPicPr>
-            <a:picLocks noChangeAspect="1"/>
-          </p:cNvPicPr>
-          <p:nvPr userDrawn="1"/>
-        </p:nvPicPr>
-        <p:blipFill>
-          <a:blip r:embed="rId2"/>
-          <a:stretch>
-            <a:fillRect/>
-          </a:stretch>
-        </p:blipFill>
+          <p:cNvSpPr>
+            <a:spLocks noGrp="1"/>
+          </p:cNvSpPr>
+          <p:nvPr>
+            <p:ph type="title"/>
+          </p:nvPr>
+        </p:nvSpPr>
         <p:spPr>
           <a:xfrm>
-            <a:off x="8117935" y="-1"/>
-            <a:ext cx="4074065" cy="1440181"/>
+            <a:off x="838200" y="144000"/>
+            <a:ext cx="10515600" cy="1080000"/>
           </a:xfrm>
-          <a:prstGeom prst="rect">
-            <a:avLst/>
-          </a:prstGeom>
         </p:spPr>
-      </p:pic>
-      <p:sp>
-        <p:nvSpPr>
-          <p:cNvPr id="2" name="标题 1">
-            <a:extLst>
-              <a:ext uri="{FF2B5EF4-FFF2-40B4-BE49-F238E27FC236}">
-                <a16:creationId xmlns:a16="http://schemas.microsoft.com/office/drawing/2014/main" id="{38DA0639-1433-E9D6-12EA-26DBAC823C06}"/>
-              </a:ext>
-            </a:extLst>
-          </p:cNvPr>
-          <p:cNvSpPr>
-            <a:spLocks noGrp="1"/>
-          </p:cNvSpPr>
-          <p:nvPr>
-            <p:ph type="title"/>
-          </p:nvPr>
-        </p:nvSpPr>
-        <p:spPr/>
         <p:txBody>
           <a:bodyPr/>
           <a:lstStyle>
@@ -811,7 +756,12 @@
             <p:ph idx="1"/>
           </p:nvPr>
         </p:nvSpPr>
-        <p:spPr/>
+        <p:spPr>
+          <a:xfrm>
+            <a:off x="838200" y="1404000"/>
+            <a:ext cx="10515600" cy="4795203"/>
+          </a:xfrm>
+        </p:spPr>
         <p:txBody>
           <a:bodyPr/>
           <a:lstStyle>
@@ -942,53 +892,28 @@
           <a:chExt cx="0" cy="0"/>
         </a:xfrm>
       </p:grpSpPr>
-      <p:pic>
-        <p:nvPicPr>
-          <p:cNvPr id="8" name="图片 7">
+      <p:sp>
+        <p:nvSpPr>
+          <p:cNvPr id="2" name="标题 1">
             <a:extLst>
               <a:ext uri="{FF2B5EF4-FFF2-40B4-BE49-F238E27FC236}">
-                <a16:creationId xmlns:a16="http://schemas.microsoft.com/office/drawing/2014/main" id="{E4084061-F7D8-42D5-83B1-03D658BB1C65}"/>
+                <a16:creationId xmlns:a16="http://schemas.microsoft.com/office/drawing/2014/main" id="{7F09BF81-8490-9E93-5A45-46A6129E7B88}"/>
               </a:ext>
             </a:extLst>
           </p:cNvPr>
-          <p:cNvPicPr>
-            <a:picLocks noChangeAspect="1"/>
-          </p:cNvPicPr>
-          <p:nvPr userDrawn="1"/>
-        </p:nvPicPr>
-        <p:blipFill>
-          <a:blip r:embed="rId2"/>
-          <a:stretch>
-            <a:fillRect/>
-          </a:stretch>
-        </p:blipFill>
+          <p:cNvSpPr>
+            <a:spLocks noGrp="1"/>
+          </p:cNvSpPr>
+          <p:nvPr>
+            <p:ph type="title"/>
+          </p:nvPr>
+        </p:nvSpPr>
         <p:spPr>
           <a:xfrm>
-            <a:off x="8117935" y="-1"/>
-            <a:ext cx="4074065" cy="1440181"/>
+            <a:off x="838800" y="144000"/>
+            <a:ext cx="10515600" cy="1080000"/>
           </a:xfrm>
-          <a:prstGeom prst="rect">
-            <a:avLst/>
-          </a:prstGeom>
         </p:spPr>
-      </p:pic>
-      <p:sp>
-        <p:nvSpPr>
-          <p:cNvPr id="2" name="标题 1">
-            <a:extLst>
-              <a:ext uri="{FF2B5EF4-FFF2-40B4-BE49-F238E27FC236}">
-                <a16:creationId xmlns:a16="http://schemas.microsoft.com/office/drawing/2014/main" id="{7F09BF81-8490-9E93-5A45-46A6129E7B88}"/>
-              </a:ext>
-            </a:extLst>
-          </p:cNvPr>
-          <p:cNvSpPr>
-            <a:spLocks noGrp="1"/>
-          </p:cNvSpPr>
-          <p:nvPr>
-            <p:ph type="title"/>
-          </p:nvPr>
-        </p:nvSpPr>
-        <p:spPr/>
         <p:txBody>
           <a:bodyPr/>
           <a:lstStyle/>
@@ -1018,8 +943,8 @@
         </p:nvSpPr>
         <p:spPr>
           <a:xfrm>
-            <a:off x="838200" y="1825625"/>
-            <a:ext cx="5181600" cy="4351338"/>
+            <a:off x="838200" y="1404000"/>
+            <a:ext cx="5181600" cy="4795200"/>
           </a:xfrm>
         </p:spPr>
         <p:txBody>
@@ -1080,8 +1005,8 @@
         </p:nvSpPr>
         <p:spPr>
           <a:xfrm>
-            <a:off x="6172200" y="1825625"/>
-            <a:ext cx="5181600" cy="4351338"/>
+            <a:off x="6172200" y="1404000"/>
+            <a:ext cx="5181600" cy="4795200"/>
           </a:xfrm>
         </p:spPr>
         <p:txBody>
@@ -1188,36 +1113,6 @@
           <a:chExt cx="0" cy="0"/>
         </a:xfrm>
       </p:grpSpPr>
-      <p:pic>
-        <p:nvPicPr>
-          <p:cNvPr id="7" name="图片 6">
-            <a:extLst>
-              <a:ext uri="{FF2B5EF4-FFF2-40B4-BE49-F238E27FC236}">
-                <a16:creationId xmlns:a16="http://schemas.microsoft.com/office/drawing/2014/main" id="{048F9FEF-3AE5-F30D-5997-4EDA2AFFEB6B}"/>
-              </a:ext>
-            </a:extLst>
-          </p:cNvPr>
-          <p:cNvPicPr>
-            <a:picLocks noChangeAspect="1"/>
-          </p:cNvPicPr>
-          <p:nvPr userDrawn="1"/>
-        </p:nvPicPr>
-        <p:blipFill>
-          <a:blip r:embed="rId5"/>
-          <a:stretch>
-            <a:fillRect/>
-          </a:stretch>
-        </p:blipFill>
-        <p:spPr>
-          <a:xfrm>
-            <a:off x="8117935" y="-1"/>
-            <a:ext cx="4074065" cy="1440181"/>
-          </a:xfrm>
-          <a:prstGeom prst="rect">
-            <a:avLst/>
-          </a:prstGeom>
-        </p:spPr>
-      </p:pic>
       <p:sp>
         <p:nvSpPr>
           <p:cNvPr id="2" name="标题占位符 1">
@@ -1370,6 +1265,42 @@
           </a:p>
         </p:txBody>
       </p:sp>
+      <p:pic>
+        <p:nvPicPr>
+          <p:cNvPr id="5" name="图形 4">
+            <a:extLst>
+              <a:ext uri="{FF2B5EF4-FFF2-40B4-BE49-F238E27FC236}">
+                <a16:creationId xmlns:a16="http://schemas.microsoft.com/office/drawing/2014/main" id="{BD0BC946-F5DC-74E0-BCDB-241947D7B19F}"/>
+              </a:ext>
+            </a:extLst>
+          </p:cNvPr>
+          <p:cNvPicPr>
+            <a:picLocks noChangeAspect="1"/>
+          </p:cNvPicPr>
+          <p:nvPr userDrawn="1"/>
+        </p:nvPicPr>
+        <p:blipFill>
+          <a:blip r:embed="rId5">
+            <a:extLst>
+              <a:ext uri="{96DAC541-7B7A-43D3-8B79-37D633B846F1}">
+                <asvg:svgBlip xmlns:asvg="http://schemas.microsoft.com/office/drawing/2016/SVG/main" r:embed="rId6"/>
+              </a:ext>
+            </a:extLst>
+          </a:blip>
+          <a:stretch>
+            <a:fillRect/>
+          </a:stretch>
+        </p:blipFill>
+        <p:spPr>
+          <a:xfrm>
+            <a:off x="9712960" y="0"/>
+            <a:ext cx="2479040" cy="1063702"/>
+          </a:xfrm>
+          <a:prstGeom prst="rect">
+            <a:avLst/>
+          </a:prstGeom>
+        </p:spPr>
+      </p:pic>
     </p:spTree>
     <p:extLst>
       <p:ext uri="{BB962C8B-B14F-4D97-AF65-F5344CB8AC3E}">
@@ -1819,7 +1750,7 @@
           <p:cNvPr id="2" name="标题 1">
             <a:extLst>
               <a:ext uri="{FF2B5EF4-FFF2-40B4-BE49-F238E27FC236}">
-                <a16:creationId xmlns:a16="http://schemas.microsoft.com/office/drawing/2014/main" id="{59F06596-F490-D331-B225-DBF1C69E9224}"/>
+                <a16:creationId xmlns:a16="http://schemas.microsoft.com/office/drawing/2014/main" id="{454DE5C1-5D5A-423B-52E1-28F1118465F6}"/>
               </a:ext>
             </a:extLst>
           </p:cNvPr>
@@ -1830,12 +1761,7 @@
             <p:ph type="title"/>
           </p:nvPr>
         </p:nvSpPr>
-        <p:spPr>
-          <a:xfrm>
-            <a:off x="838200" y="365125"/>
-            <a:ext cx="7467600" cy="1325563"/>
-          </a:xfrm>
-        </p:spPr>
+        <p:spPr/>
         <p:txBody>
           <a:bodyPr/>
           <a:lstStyle/>
@@ -1852,7 +1778,7 @@
           <p:cNvPr id="3" name="内容占位符 2">
             <a:extLst>
               <a:ext uri="{FF2B5EF4-FFF2-40B4-BE49-F238E27FC236}">
-                <a16:creationId xmlns:a16="http://schemas.microsoft.com/office/drawing/2014/main" id="{8A31555B-024D-767E-ECE8-D5F11567EFDB}"/>
+                <a16:creationId xmlns:a16="http://schemas.microsoft.com/office/drawing/2014/main" id="{BAEB628C-9346-81CB-BA7E-21D665228FB1}"/>
               </a:ext>
             </a:extLst>
           </p:cNvPr>
@@ -1881,7 +1807,7 @@
           <p:cNvPr id="4" name="灯片编号占位符 3">
             <a:extLst>
               <a:ext uri="{FF2B5EF4-FFF2-40B4-BE49-F238E27FC236}">
-                <a16:creationId xmlns:a16="http://schemas.microsoft.com/office/drawing/2014/main" id="{DBCB926C-9366-B3B4-32D2-D068D628FCEA}"/>
+                <a16:creationId xmlns:a16="http://schemas.microsoft.com/office/drawing/2014/main" id="{510B0AE9-E1B2-1CE4-0D96-C1CC2AB04A9E}"/>
               </a:ext>
             </a:extLst>
           </p:cNvPr>
@@ -1908,7 +1834,7 @@
     </p:spTree>
     <p:extLst>
       <p:ext uri="{BB962C8B-B14F-4D97-AF65-F5344CB8AC3E}">
-        <p14:creationId xmlns:p14="http://schemas.microsoft.com/office/powerpoint/2010/main" val="2231608290"/>
+        <p14:creationId xmlns:p14="http://schemas.microsoft.com/office/powerpoint/2010/main" val="2664995045"/>
       </p:ext>
     </p:extLst>
   </p:cSld>

</xml_diff>

<commit_message>
add QR code at the end
</commit_message>
<xml_diff>
--- a/PPT模板/华科开放原子开源俱乐部模板.pptx
+++ b/PPT模板/华科开放原子开源俱乐部模板.pptx
@@ -2239,6 +2239,124 @@
               <a:t>5</a:t>
             </a:fld>
             <a:endParaRPr kumimoji="1" lang="zh-CN" altLang="en-US"/>
+          </a:p>
+        </p:txBody>
+      </p:sp>
+      <p:pic>
+        <p:nvPicPr>
+          <p:cNvPr id="6" name="图片 5">
+            <a:extLst>
+              <a:ext uri="{FF2B5EF4-FFF2-40B4-BE49-F238E27FC236}">
+                <a16:creationId xmlns:a16="http://schemas.microsoft.com/office/drawing/2014/main" id="{3004DBE7-996D-18C4-C809-726090C4CD61}"/>
+              </a:ext>
+            </a:extLst>
+          </p:cNvPr>
+          <p:cNvPicPr>
+            <a:picLocks noChangeAspect="1"/>
+          </p:cNvPicPr>
+          <p:nvPr/>
+        </p:nvPicPr>
+        <p:blipFill>
+          <a:blip r:embed="rId3"/>
+          <a:stretch>
+            <a:fillRect/>
+          </a:stretch>
+        </p:blipFill>
+        <p:spPr>
+          <a:xfrm>
+            <a:off x="8367326" y="1604888"/>
+            <a:ext cx="3537174" cy="3537174"/>
+          </a:xfrm>
+          <a:prstGeom prst="rect">
+            <a:avLst/>
+          </a:prstGeom>
+        </p:spPr>
+      </p:pic>
+      <p:sp>
+        <p:nvSpPr>
+          <p:cNvPr id="8" name="文本框 7">
+            <a:extLst>
+              <a:ext uri="{FF2B5EF4-FFF2-40B4-BE49-F238E27FC236}">
+                <a16:creationId xmlns:a16="http://schemas.microsoft.com/office/drawing/2014/main" id="{C35222C3-518F-7E99-3B90-80A39B6F3EF4}"/>
+              </a:ext>
+            </a:extLst>
+          </p:cNvPr>
+          <p:cNvSpPr txBox="1"/>
+          <p:nvPr/>
+        </p:nvSpPr>
+        <p:spPr>
+          <a:xfrm>
+            <a:off x="8507185" y="5215948"/>
+            <a:ext cx="3265715" cy="707886"/>
+          </a:xfrm>
+          <a:prstGeom prst="rect">
+            <a:avLst/>
+          </a:prstGeom>
+          <a:noFill/>
+        </p:spPr>
+        <p:txBody>
+          <a:bodyPr wrap="square">
+            <a:spAutoFit/>
+          </a:bodyPr>
+          <a:lstStyle/>
+          <a:p>
+            <a:r>
+              <a:rPr lang="zh-CN" altLang="en-US" sz="2000" b="1" i="0" dirty="0">
+                <a:solidFill>
+                  <a:srgbClr val="353535"/>
+                </a:solidFill>
+                <a:effectLst/>
+                <a:latin typeface="mp-quote"/>
+              </a:rPr>
+              <a:t>公众号</a:t>
+            </a:r>
+            <a:r>
+              <a:rPr lang="zh-CN" altLang="en-US" sz="2000" b="0" i="0" dirty="0">
+                <a:solidFill>
+                  <a:srgbClr val="353535"/>
+                </a:solidFill>
+                <a:effectLst/>
+                <a:latin typeface="mp-quote"/>
+              </a:rPr>
+              <a:t>：开源内核安全修炼</a:t>
+            </a:r>
+            <a:endParaRPr lang="en-US" altLang="zh-CN" sz="2000" b="0" i="0" dirty="0">
+              <a:solidFill>
+                <a:srgbClr val="353535"/>
+              </a:solidFill>
+              <a:effectLst/>
+              <a:latin typeface="mp-quote"/>
+            </a:endParaRPr>
+          </a:p>
+          <a:p>
+            <a:r>
+              <a:rPr lang="zh-CN" altLang="en-US" sz="2000" b="1" dirty="0">
+                <a:solidFill>
+                  <a:srgbClr val="353535"/>
+                </a:solidFill>
+                <a:latin typeface="mp-quote"/>
+              </a:rPr>
+              <a:t>微信号</a:t>
+            </a:r>
+            <a:r>
+              <a:rPr lang="zh-CN" altLang="en-US" sz="2000" dirty="0">
+                <a:solidFill>
+                  <a:srgbClr val="353535"/>
+                </a:solidFill>
+                <a:latin typeface="mp-quote"/>
+              </a:rPr>
+              <a:t>：</a:t>
+            </a:r>
+            <a:r>
+              <a:rPr lang="en-US" altLang="zh-CN" sz="2000" dirty="0" err="1">
+                <a:solidFill>
+                  <a:srgbClr val="353535"/>
+                </a:solidFill>
+                <a:latin typeface="mp-quote"/>
+              </a:rPr>
+              <a:t>kernel_sec_pratice</a:t>
+            </a:r>
+            <a:endParaRPr lang="zh-CN" altLang="en-US" sz="2000" dirty="0"/>
           </a:p>
         </p:txBody>
       </p:sp>

</xml_diff>